<commit_message>
updated PPTX and included Monia.ipyb
</commit_message>
<xml_diff>
--- a/NLP Project - G5.pptx
+++ b/NLP Project - G5.pptx
@@ -5,7 +5,7 @@
     <p:sldMasterId id="2147483648" r:id="rId1"/>
   </p:sldMasterIdLst>
   <p:sldIdLst>
-    <p:sldId id="256" r:id="rId2"/>
+    <p:sldId id="263" r:id="rId2"/>
     <p:sldId id="257" r:id="rId3"/>
     <p:sldId id="258" r:id="rId4"/>
     <p:sldId id="259" r:id="rId5"/>
@@ -110,13 +110,18 @@
       </a:defRPr>
     </a:lvl9pPr>
   </p:defaultTextStyle>
+  <p:extLst>
+    <p:ext uri="{EFAFB233-063F-42B5-8137-9DF3F51BA10A}">
+      <p15:sldGuideLst xmlns:p15="http://schemas.microsoft.com/office/powerpoint/2012/main"/>
+    </p:ext>
+  </p:extLst>
 </p:presentation>
 </file>
 
 <file path=ppt/charts/chart1.xml><?xml version="1.0" encoding="utf-8"?>
 <c:chartSpace xmlns:c="http://schemas.openxmlformats.org/drawingml/2006/chart" xmlns:a="http://schemas.openxmlformats.org/drawingml/2006/main" xmlns:r="http://schemas.openxmlformats.org/officeDocument/2006/relationships" xmlns:c16r2="http://schemas.microsoft.com/office/drawing/2015/06/chart">
   <c:date1904 val="0"/>
-  <c:lang val="en-US"/>
+  <c:lang val="pt-PT"/>
   <c:roundedCorners val="0"/>
   <mc:AlternateContent xmlns:mc="http://schemas.openxmlformats.org/markup-compatibility/2006">
     <mc:Choice xmlns:c14="http://schemas.microsoft.com/office/drawing/2007/8/2/chart" Requires="c14">
@@ -178,7 +183,7 @@
               <a:cs typeface="+mn-cs"/>
             </a:defRPr>
           </a:pPr>
-          <a:endParaRPr lang="en-US"/>
+          <a:endParaRPr lang="pt-PT"/>
         </a:p>
       </c:txPr>
     </c:title>
@@ -389,7 +394,7 @@
                 <a:cs typeface="+mn-cs"/>
               </a:defRPr>
             </a:pPr>
-            <a:endParaRPr lang="en-US"/>
+            <a:endParaRPr lang="pt-PT"/>
           </a:p>
         </c:txPr>
         <c:crossAx val="109778767"/>
@@ -448,7 +453,7 @@
                 <a:cs typeface="+mn-cs"/>
               </a:defRPr>
             </a:pPr>
-            <a:endParaRPr lang="en-US"/>
+            <a:endParaRPr lang="pt-PT"/>
           </a:p>
         </c:txPr>
         <c:crossAx val="109254431"/>
@@ -490,7 +495,7 @@
               <a:cs typeface="+mn-cs"/>
             </a:defRPr>
           </a:pPr>
-          <a:endParaRPr lang="en-US"/>
+          <a:endParaRPr lang="pt-PT"/>
         </a:p>
       </c:txPr>
     </c:legend>
@@ -519,7 +524,7 @@
       <a:pPr>
         <a:defRPr/>
       </a:pPr>
-      <a:endParaRPr lang="en-US"/>
+      <a:endParaRPr lang="pt-PT"/>
     </a:p>
   </c:txPr>
   <c:externalData r:id="rId3">
@@ -531,7 +536,7 @@
 <file path=ppt/charts/chart2.xml><?xml version="1.0" encoding="utf-8"?>
 <c:chartSpace xmlns:c="http://schemas.openxmlformats.org/drawingml/2006/chart" xmlns:a="http://schemas.openxmlformats.org/drawingml/2006/main" xmlns:r="http://schemas.openxmlformats.org/officeDocument/2006/relationships" xmlns:c16r2="http://schemas.microsoft.com/office/drawing/2015/06/chart">
   <c:date1904 val="0"/>
-  <c:lang val="en-US"/>
+  <c:lang val="pt-PT"/>
   <c:roundedCorners val="0"/>
   <mc:AlternateContent xmlns:mc="http://schemas.openxmlformats.org/markup-compatibility/2006">
     <mc:Choice xmlns:c14="http://schemas.microsoft.com/office/drawing/2007/8/2/chart" Requires="c14">
@@ -593,7 +598,7 @@
               <a:cs typeface="+mn-cs"/>
             </a:defRPr>
           </a:pPr>
-          <a:endParaRPr lang="en-US"/>
+          <a:endParaRPr lang="pt-PT"/>
         </a:p>
       </c:txPr>
     </c:title>
@@ -878,7 +883,7 @@
                 <a:cs typeface="+mn-cs"/>
               </a:defRPr>
             </a:pPr>
-            <a:endParaRPr lang="en-US"/>
+            <a:endParaRPr lang="pt-PT"/>
           </a:p>
         </c:txPr>
         <c:crossAx val="109778767"/>
@@ -937,7 +942,7 @@
                 <a:cs typeface="+mn-cs"/>
               </a:defRPr>
             </a:pPr>
-            <a:endParaRPr lang="en-US"/>
+            <a:endParaRPr lang="pt-PT"/>
           </a:p>
         </c:txPr>
         <c:crossAx val="109254431"/>
@@ -979,7 +984,7 @@
               <a:cs typeface="+mn-cs"/>
             </a:defRPr>
           </a:pPr>
-          <a:endParaRPr lang="en-US"/>
+          <a:endParaRPr lang="pt-PT"/>
         </a:p>
       </c:txPr>
     </c:legend>
@@ -1008,7 +1013,7 @@
       <a:pPr>
         <a:defRPr/>
       </a:pPr>
-      <a:endParaRPr lang="en-US"/>
+      <a:endParaRPr lang="pt-PT"/>
     </a:p>
   </c:txPr>
   <c:externalData r:id="rId3">
@@ -1020,7 +1025,7 @@
 <file path=ppt/charts/chart3.xml><?xml version="1.0" encoding="utf-8"?>
 <c:chartSpace xmlns:c="http://schemas.openxmlformats.org/drawingml/2006/chart" xmlns:a="http://schemas.openxmlformats.org/drawingml/2006/main" xmlns:r="http://schemas.openxmlformats.org/officeDocument/2006/relationships" xmlns:c16r2="http://schemas.microsoft.com/office/drawing/2015/06/chart">
   <c:date1904 val="0"/>
-  <c:lang val="en-US"/>
+  <c:lang val="pt-PT"/>
   <c:roundedCorners val="0"/>
   <mc:AlternateContent xmlns:mc="http://schemas.openxmlformats.org/markup-compatibility/2006">
     <mc:Choice xmlns:c14="http://schemas.microsoft.com/office/drawing/2007/8/2/chart" Requires="c14">
@@ -1082,7 +1087,7 @@
               <a:cs typeface="+mn-cs"/>
             </a:defRPr>
           </a:pPr>
-          <a:endParaRPr lang="en-US"/>
+          <a:endParaRPr lang="pt-PT"/>
         </a:p>
       </c:txPr>
     </c:title>
@@ -1359,7 +1364,7 @@
                 <a:cs typeface="+mn-cs"/>
               </a:defRPr>
             </a:pPr>
-            <a:endParaRPr lang="en-US"/>
+            <a:endParaRPr lang="pt-PT"/>
           </a:p>
         </c:txPr>
         <c:crossAx val="109778767"/>
@@ -1418,7 +1423,7 @@
                 <a:cs typeface="+mn-cs"/>
               </a:defRPr>
             </a:pPr>
-            <a:endParaRPr lang="en-US"/>
+            <a:endParaRPr lang="pt-PT"/>
           </a:p>
         </c:txPr>
         <c:crossAx val="109254431"/>
@@ -1460,7 +1465,7 @@
               <a:cs typeface="+mn-cs"/>
             </a:defRPr>
           </a:pPr>
-          <a:endParaRPr lang="en-US"/>
+          <a:endParaRPr lang="pt-PT"/>
         </a:p>
       </c:txPr>
     </c:legend>
@@ -1489,7 +1494,7 @@
       <a:pPr>
         <a:defRPr/>
       </a:pPr>
-      <a:endParaRPr lang="en-US"/>
+      <a:endParaRPr lang="pt-PT"/>
     </a:p>
   </c:txPr>
   <c:externalData r:id="rId3">
@@ -1501,7 +1506,7 @@
 <file path=ppt/charts/chart4.xml><?xml version="1.0" encoding="utf-8"?>
 <c:chartSpace xmlns:c="http://schemas.openxmlformats.org/drawingml/2006/chart" xmlns:a="http://schemas.openxmlformats.org/drawingml/2006/main" xmlns:r="http://schemas.openxmlformats.org/officeDocument/2006/relationships" xmlns:c16r2="http://schemas.microsoft.com/office/drawing/2015/06/chart">
   <c:date1904 val="0"/>
-  <c:lang val="en-US"/>
+  <c:lang val="pt-PT"/>
   <c:roundedCorners val="0"/>
   <mc:AlternateContent xmlns:mc="http://schemas.openxmlformats.org/markup-compatibility/2006">
     <mc:Choice xmlns:c14="http://schemas.microsoft.com/office/drawing/2007/8/2/chart" Requires="c14">
@@ -1563,7 +1568,7 @@
               <a:cs typeface="+mn-cs"/>
             </a:defRPr>
           </a:pPr>
-          <a:endParaRPr lang="en-US"/>
+          <a:endParaRPr lang="pt-PT"/>
         </a:p>
       </c:txPr>
     </c:title>
@@ -1786,7 +1791,7 @@
                 <a:cs typeface="+mn-cs"/>
               </a:defRPr>
             </a:pPr>
-            <a:endParaRPr lang="en-US"/>
+            <a:endParaRPr lang="pt-PT"/>
           </a:p>
         </c:txPr>
         <c:crossAx val="109778767"/>
@@ -1847,7 +1852,7 @@
                 <a:cs typeface="+mn-cs"/>
               </a:defRPr>
             </a:pPr>
-            <a:endParaRPr lang="en-US"/>
+            <a:endParaRPr lang="pt-PT"/>
           </a:p>
         </c:txPr>
         <c:crossAx val="109254431"/>
@@ -1889,7 +1894,7 @@
               <a:cs typeface="+mn-cs"/>
             </a:defRPr>
           </a:pPr>
-          <a:endParaRPr lang="en-US"/>
+          <a:endParaRPr lang="pt-PT"/>
         </a:p>
       </c:txPr>
     </c:legend>
@@ -1918,7 +1923,7 @@
       <a:pPr>
         <a:defRPr/>
       </a:pPr>
-      <a:endParaRPr lang="en-US"/>
+      <a:endParaRPr lang="pt-PT"/>
     </a:p>
   </c:txPr>
   <c:externalData r:id="rId3">
@@ -4297,7 +4302,7 @@
           <a:lstStyle/>
           <a:p>
             <a:fld id="{83F8789F-F040-1246-9F38-E63023A0164B}" type="datetimeFigureOut">
-              <a:t>10/3/24</a:t>
+              <a:t>04/10/2024</a:t>
             </a:fld>
             <a:endParaRPr lang="en-US"/>
           </a:p>
@@ -4350,7 +4355,7 @@
           <a:lstStyle/>
           <a:p>
             <a:fld id="{68C28C03-D10A-AE46-9567-8D9AA2376AB0}" type="slidenum">
-              <a:t>‹#›</a:t>
+              <a:t>‹nº›</a:t>
             </a:fld>
             <a:endParaRPr lang="en-US"/>
           </a:p>
@@ -4493,7 +4498,7 @@
           <a:lstStyle/>
           <a:p>
             <a:fld id="{83F8789F-F040-1246-9F38-E63023A0164B}" type="datetimeFigureOut">
-              <a:t>10/3/24</a:t>
+              <a:t>04/10/2024</a:t>
             </a:fld>
             <a:endParaRPr lang="en-US"/>
           </a:p>
@@ -4546,7 +4551,7 @@
           <a:lstStyle/>
           <a:p>
             <a:fld id="{68C28C03-D10A-AE46-9567-8D9AA2376AB0}" type="slidenum">
-              <a:t>‹#›</a:t>
+              <a:t>‹nº›</a:t>
             </a:fld>
             <a:endParaRPr lang="en-US"/>
           </a:p>
@@ -4699,7 +4704,7 @@
           <a:lstStyle/>
           <a:p>
             <a:fld id="{83F8789F-F040-1246-9F38-E63023A0164B}" type="datetimeFigureOut">
-              <a:t>10/3/24</a:t>
+              <a:t>04/10/2024</a:t>
             </a:fld>
             <a:endParaRPr lang="en-US"/>
           </a:p>
@@ -4752,7 +4757,7 @@
           <a:lstStyle/>
           <a:p>
             <a:fld id="{68C28C03-D10A-AE46-9567-8D9AA2376AB0}" type="slidenum">
-              <a:t>‹#›</a:t>
+              <a:t>‹nº›</a:t>
             </a:fld>
             <a:endParaRPr lang="en-US"/>
           </a:p>
@@ -4895,7 +4900,7 @@
           <a:lstStyle/>
           <a:p>
             <a:fld id="{83F8789F-F040-1246-9F38-E63023A0164B}" type="datetimeFigureOut">
-              <a:t>10/3/24</a:t>
+              <a:t>04/10/2024</a:t>
             </a:fld>
             <a:endParaRPr lang="en-US"/>
           </a:p>
@@ -4948,7 +4953,7 @@
           <a:lstStyle/>
           <a:p>
             <a:fld id="{68C28C03-D10A-AE46-9567-8D9AA2376AB0}" type="slidenum">
-              <a:t>‹#›</a:t>
+              <a:t>‹nº›</a:t>
             </a:fld>
             <a:endParaRPr lang="en-US"/>
           </a:p>
@@ -5168,7 +5173,7 @@
           <a:lstStyle/>
           <a:p>
             <a:fld id="{83F8789F-F040-1246-9F38-E63023A0164B}" type="datetimeFigureOut">
-              <a:t>10/3/24</a:t>
+              <a:t>04/10/2024</a:t>
             </a:fld>
             <a:endParaRPr lang="en-US"/>
           </a:p>
@@ -5221,7 +5226,7 @@
           <a:lstStyle/>
           <a:p>
             <a:fld id="{68C28C03-D10A-AE46-9567-8D9AA2376AB0}" type="slidenum">
-              <a:t>‹#›</a:t>
+              <a:t>‹nº›</a:t>
             </a:fld>
             <a:endParaRPr lang="en-US"/>
           </a:p>
@@ -5431,7 +5436,7 @@
           <a:lstStyle/>
           <a:p>
             <a:fld id="{83F8789F-F040-1246-9F38-E63023A0164B}" type="datetimeFigureOut">
-              <a:t>10/3/24</a:t>
+              <a:t>04/10/2024</a:t>
             </a:fld>
             <a:endParaRPr lang="en-US"/>
           </a:p>
@@ -5484,7 +5489,7 @@
           <a:lstStyle/>
           <a:p>
             <a:fld id="{68C28C03-D10A-AE46-9567-8D9AA2376AB0}" type="slidenum">
-              <a:t>‹#›</a:t>
+              <a:t>‹nº›</a:t>
             </a:fld>
             <a:endParaRPr lang="en-US"/>
           </a:p>
@@ -5841,7 +5846,7 @@
           <a:lstStyle/>
           <a:p>
             <a:fld id="{83F8789F-F040-1246-9F38-E63023A0164B}" type="datetimeFigureOut">
-              <a:t>10/3/24</a:t>
+              <a:t>04/10/2024</a:t>
             </a:fld>
             <a:endParaRPr lang="en-US"/>
           </a:p>
@@ -5894,7 +5899,7 @@
           <a:lstStyle/>
           <a:p>
             <a:fld id="{68C28C03-D10A-AE46-9567-8D9AA2376AB0}" type="slidenum">
-              <a:t>‹#›</a:t>
+              <a:t>‹nº›</a:t>
             </a:fld>
             <a:endParaRPr lang="en-US"/>
           </a:p>
@@ -5980,7 +5985,7 @@
           <a:lstStyle/>
           <a:p>
             <a:fld id="{83F8789F-F040-1246-9F38-E63023A0164B}" type="datetimeFigureOut">
-              <a:t>10/3/24</a:t>
+              <a:t>04/10/2024</a:t>
             </a:fld>
             <a:endParaRPr lang="en-US"/>
           </a:p>
@@ -6033,7 +6038,7 @@
           <a:lstStyle/>
           <a:p>
             <a:fld id="{68C28C03-D10A-AE46-9567-8D9AA2376AB0}" type="slidenum">
-              <a:t>‹#›</a:t>
+              <a:t>‹nº›</a:t>
             </a:fld>
             <a:endParaRPr lang="en-US"/>
           </a:p>
@@ -6091,7 +6096,7 @@
           <a:lstStyle/>
           <a:p>
             <a:fld id="{83F8789F-F040-1246-9F38-E63023A0164B}" type="datetimeFigureOut">
-              <a:t>10/3/24</a:t>
+              <a:t>04/10/2024</a:t>
             </a:fld>
             <a:endParaRPr lang="en-US"/>
           </a:p>
@@ -6144,7 +6149,7 @@
           <a:lstStyle/>
           <a:p>
             <a:fld id="{68C28C03-D10A-AE46-9567-8D9AA2376AB0}" type="slidenum">
-              <a:t>‹#›</a:t>
+              <a:t>‹nº›</a:t>
             </a:fld>
             <a:endParaRPr lang="en-US"/>
           </a:p>
@@ -6400,7 +6405,7 @@
           <a:lstStyle/>
           <a:p>
             <a:fld id="{83F8789F-F040-1246-9F38-E63023A0164B}" type="datetimeFigureOut">
-              <a:t>10/3/24</a:t>
+              <a:t>04/10/2024</a:t>
             </a:fld>
             <a:endParaRPr lang="en-US"/>
           </a:p>
@@ -6453,7 +6458,7 @@
           <a:lstStyle/>
           <a:p>
             <a:fld id="{68C28C03-D10A-AE46-9567-8D9AA2376AB0}" type="slidenum">
-              <a:t>‹#›</a:t>
+              <a:t>‹nº›</a:t>
             </a:fld>
             <a:endParaRPr lang="en-US"/>
           </a:p>
@@ -6686,7 +6691,7 @@
           <a:lstStyle/>
           <a:p>
             <a:fld id="{83F8789F-F040-1246-9F38-E63023A0164B}" type="datetimeFigureOut">
-              <a:t>10/3/24</a:t>
+              <a:t>04/10/2024</a:t>
             </a:fld>
             <a:endParaRPr lang="en-US"/>
           </a:p>
@@ -6739,7 +6744,7 @@
           <a:lstStyle/>
           <a:p>
             <a:fld id="{68C28C03-D10A-AE46-9567-8D9AA2376AB0}" type="slidenum">
-              <a:t>‹#›</a:t>
+              <a:t>‹nº›</a:t>
             </a:fld>
             <a:endParaRPr lang="en-US"/>
           </a:p>
@@ -6925,7 +6930,7 @@
           </a:lstStyle>
           <a:p>
             <a:fld id="{83F8789F-F040-1246-9F38-E63023A0164B}" type="datetimeFigureOut">
-              <a:t>10/3/24</a:t>
+              <a:t>04/10/2024</a:t>
             </a:fld>
             <a:endParaRPr lang="en-US"/>
           </a:p>
@@ -7014,7 +7019,7 @@
           </a:lstStyle>
           <a:p>
             <a:fld id="{68C28C03-D10A-AE46-9567-8D9AA2376AB0}" type="slidenum">
-              <a:t>‹#›</a:t>
+              <a:t>‹nº›</a:t>
             </a:fld>
             <a:endParaRPr lang="en-US"/>
           </a:p>
@@ -7343,10 +7348,273 @@
       </p:grpSpPr>
       <p:sp>
         <p:nvSpPr>
-          <p:cNvPr id="2" name="Title 1">
+          <p:cNvPr id="2" name="Title 1"/>
+          <p:cNvSpPr>
+            <a:spLocks noGrp="1"/>
+          </p:cNvSpPr>
+          <p:nvPr>
+            <p:ph type="title"/>
+          </p:nvPr>
+        </p:nvSpPr>
+        <p:spPr/>
+        <p:txBody>
+          <a:bodyPr/>
+          <a:lstStyle/>
+          <a:p>
+            <a:pPr algn="ctr"/>
+            <a:r>
+              <a:rPr lang="pt-PT" sz="1800" dirty="0" err="1">
+                <a:solidFill>
+                  <a:srgbClr val="32C3FF"/>
+                </a:solidFill>
+                <a:latin typeface="+mn-lt"/>
+                <a:ea typeface="+mn-ea"/>
+                <a:cs typeface="+mn-cs"/>
+              </a:rPr>
+              <a:t>The</a:t>
+            </a:r>
+            <a:r>
+              <a:rPr lang="pt-PT" sz="1800" dirty="0">
+                <a:solidFill>
+                  <a:srgbClr val="32C3FF"/>
+                </a:solidFill>
+                <a:latin typeface="+mn-lt"/>
+                <a:ea typeface="+mn-ea"/>
+                <a:cs typeface="+mn-cs"/>
+              </a:rPr>
+              <a:t> </a:t>
+            </a:r>
+            <a:r>
+              <a:rPr lang="pt-PT" sz="1800" dirty="0" err="1">
+                <a:solidFill>
+                  <a:srgbClr val="32C3FF"/>
+                </a:solidFill>
+                <a:latin typeface="+mn-lt"/>
+                <a:ea typeface="+mn-ea"/>
+                <a:cs typeface="+mn-cs"/>
+              </a:rPr>
+              <a:t>fabulous</a:t>
+            </a:r>
+            <a:r>
+              <a:rPr lang="pt-PT" sz="1800" dirty="0">
+                <a:solidFill>
+                  <a:srgbClr val="32C3FF"/>
+                </a:solidFill>
+                <a:latin typeface="+mn-lt"/>
+                <a:ea typeface="+mn-ea"/>
+                <a:cs typeface="+mn-cs"/>
+              </a:rPr>
+              <a:t> G5</a:t>
+            </a:r>
+            <a:endParaRPr sz="1800" dirty="0">
+              <a:solidFill>
+                <a:srgbClr val="32C3FF"/>
+              </a:solidFill>
+              <a:latin typeface="+mn-lt"/>
+              <a:ea typeface="+mn-ea"/>
+              <a:cs typeface="+mn-cs"/>
+            </a:endParaRPr>
+          </a:p>
+        </p:txBody>
+      </p:sp>
+      <p:pic>
+        <p:nvPicPr>
+          <p:cNvPr id="5" name="Imagem 4">
             <a:extLst>
               <a:ext uri="{FF2B5EF4-FFF2-40B4-BE49-F238E27FC236}">
-                <a16:creationId xmlns:a16="http://schemas.microsoft.com/office/drawing/2014/main" id="{C8912072-214B-34B9-0483-263E7F504A87}"/>
+                <a16:creationId xmlns:a16="http://schemas.microsoft.com/office/drawing/2014/main" id="{9A179358-77E6-8CC1-CE18-88C62392F68D}"/>
+              </a:ext>
+            </a:extLst>
+          </p:cNvPr>
+          <p:cNvPicPr>
+            <a:picLocks noChangeAspect="1"/>
+          </p:cNvPicPr>
+          <p:nvPr/>
+        </p:nvPicPr>
+        <p:blipFill>
+          <a:blip r:embed="rId2"/>
+          <a:stretch>
+            <a:fillRect/>
+          </a:stretch>
+        </p:blipFill>
+        <p:spPr>
+          <a:xfrm>
+            <a:off x="5416296" y="2546763"/>
+            <a:ext cx="1828800" cy="1828800"/>
+          </a:xfrm>
+          <a:prstGeom prst="ellipse">
+            <a:avLst/>
+          </a:prstGeom>
+          <a:ln w="63500" cap="rnd">
+            <a:solidFill>
+              <a:schemeClr val="bg1"/>
+            </a:solidFill>
+          </a:ln>
+          <a:effectLst>
+            <a:outerShdw blurRad="381000" dist="292100" dir="5400000" sx="-80000" sy="-18000" rotWithShape="0">
+              <a:srgbClr val="000000">
+                <a:alpha val="22000"/>
+              </a:srgbClr>
+            </a:outerShdw>
+          </a:effectLst>
+          <a:scene3d>
+            <a:camera prst="orthographicFront"/>
+            <a:lightRig rig="contrasting" dir="t">
+              <a:rot lat="0" lon="0" rev="3000000"/>
+            </a:lightRig>
+          </a:scene3d>
+          <a:sp3d contourW="7620">
+            <a:bevelT w="95250" h="31750"/>
+            <a:contourClr>
+              <a:srgbClr val="333333"/>
+            </a:contourClr>
+          </a:sp3d>
+        </p:spPr>
+      </p:pic>
+      <p:sp>
+        <p:nvSpPr>
+          <p:cNvPr id="8" name="CaixaDeTexto 7">
+            <a:extLst>
+              <a:ext uri="{FF2B5EF4-FFF2-40B4-BE49-F238E27FC236}">
+                <a16:creationId xmlns:a16="http://schemas.microsoft.com/office/drawing/2014/main" id="{0E802480-A68C-C828-2C8E-BD13DD8A3C23}"/>
+              </a:ext>
+            </a:extLst>
+          </p:cNvPr>
+          <p:cNvSpPr txBox="1"/>
+          <p:nvPr/>
+        </p:nvSpPr>
+        <p:spPr>
+          <a:xfrm>
+            <a:off x="8526780" y="4549194"/>
+            <a:ext cx="1828800" cy="369332"/>
+          </a:xfrm>
+          <a:prstGeom prst="rect">
+            <a:avLst/>
+          </a:prstGeom>
+          <a:noFill/>
+        </p:spPr>
+        <p:txBody>
+          <a:bodyPr wrap="square" rtlCol="0">
+            <a:spAutoFit/>
+          </a:bodyPr>
+          <a:lstStyle/>
+          <a:p>
+            <a:r>
+              <a:rPr lang="pt-PT" dirty="0" err="1">
+                <a:solidFill>
+                  <a:srgbClr val="32C3FF"/>
+                </a:solidFill>
+              </a:rPr>
+              <a:t>Karthik</a:t>
+            </a:r>
+            <a:endParaRPr lang="pt-PT" dirty="0">
+              <a:solidFill>
+                <a:srgbClr val="32C3FF"/>
+              </a:solidFill>
+            </a:endParaRPr>
+          </a:p>
+        </p:txBody>
+      </p:sp>
+      <p:sp>
+        <p:nvSpPr>
+          <p:cNvPr id="10" name="CaixaDeTexto 9">
+            <a:extLst>
+              <a:ext uri="{FF2B5EF4-FFF2-40B4-BE49-F238E27FC236}">
+                <a16:creationId xmlns:a16="http://schemas.microsoft.com/office/drawing/2014/main" id="{E6425457-F38D-6BF9-92D2-52230B132A01}"/>
+              </a:ext>
+            </a:extLst>
+          </p:cNvPr>
+          <p:cNvSpPr txBox="1"/>
+          <p:nvPr/>
+        </p:nvSpPr>
+        <p:spPr>
+          <a:xfrm>
+            <a:off x="5416296" y="4581880"/>
+            <a:ext cx="1828800" cy="369332"/>
+          </a:xfrm>
+          <a:prstGeom prst="rect">
+            <a:avLst/>
+          </a:prstGeom>
+          <a:noFill/>
+        </p:spPr>
+        <p:txBody>
+          <a:bodyPr wrap="square" rtlCol="0">
+            <a:spAutoFit/>
+          </a:bodyPr>
+          <a:lstStyle/>
+          <a:p>
+            <a:r>
+              <a:rPr lang="pt-PT" dirty="0">
+                <a:solidFill>
+                  <a:srgbClr val="32C3FF"/>
+                </a:solidFill>
+              </a:rPr>
+              <a:t>Mónia Gomes</a:t>
+            </a:r>
+          </a:p>
+        </p:txBody>
+      </p:sp>
+      <p:sp>
+        <p:nvSpPr>
+          <p:cNvPr id="11" name="CaixaDeTexto 10">
+            <a:extLst>
+              <a:ext uri="{FF2B5EF4-FFF2-40B4-BE49-F238E27FC236}">
+                <a16:creationId xmlns:a16="http://schemas.microsoft.com/office/drawing/2014/main" id="{34343FF2-65D1-4942-1E31-B4B96E38F45D}"/>
+              </a:ext>
+            </a:extLst>
+          </p:cNvPr>
+          <p:cNvSpPr txBox="1"/>
+          <p:nvPr/>
+        </p:nvSpPr>
+        <p:spPr>
+          <a:xfrm>
+            <a:off x="2299716" y="4549194"/>
+            <a:ext cx="1828800" cy="369332"/>
+          </a:xfrm>
+          <a:prstGeom prst="rect">
+            <a:avLst/>
+          </a:prstGeom>
+          <a:noFill/>
+        </p:spPr>
+        <p:txBody>
+          <a:bodyPr wrap="square" rtlCol="0">
+            <a:spAutoFit/>
+          </a:bodyPr>
+          <a:lstStyle/>
+          <a:p>
+            <a:r>
+              <a:rPr lang="pt-PT" dirty="0">
+                <a:solidFill>
+                  <a:srgbClr val="32C3FF"/>
+                </a:solidFill>
+              </a:rPr>
+              <a:t>Javi </a:t>
+            </a:r>
+            <a:r>
+              <a:rPr lang="pt-PT" dirty="0" err="1">
+                <a:solidFill>
+                  <a:srgbClr val="32C3FF"/>
+                </a:solidFill>
+              </a:rPr>
+              <a:t>Ansoleaga</a:t>
+            </a:r>
+            <a:r>
+              <a:rPr lang="pt-PT" dirty="0">
+                <a:solidFill>
+                  <a:srgbClr val="32C3FF"/>
+                </a:solidFill>
+              </a:rPr>
+              <a:t> </a:t>
+            </a:r>
+          </a:p>
+        </p:txBody>
+      </p:sp>
+      <p:sp>
+        <p:nvSpPr>
+          <p:cNvPr id="15" name="Marcador de Posição do Rodapé 14">
+            <a:extLst>
+              <a:ext uri="{FF2B5EF4-FFF2-40B4-BE49-F238E27FC236}">
+                <a16:creationId xmlns:a16="http://schemas.microsoft.com/office/drawing/2014/main" id="{D5E7FE57-1F3B-C194-6186-938A13E362ED}"/>
               </a:ext>
             </a:extLst>
           </p:cNvPr>
@@ -7354,7 +7622,7 @@
             <a:spLocks noGrp="1"/>
           </p:cNvSpPr>
           <p:nvPr>
-            <p:ph type="ctrTitle"/>
+            <p:ph type="ftr" sz="quarter" idx="11"/>
           </p:nvPr>
         </p:nvSpPr>
         <p:spPr/>
@@ -7363,18 +7631,22 @@
           <a:lstStyle/>
           <a:p>
             <a:r>
-              <a:rPr lang="en-US"/>
-              <a:t>Title slide</a:t>
+              <a:rPr lang="en-US" dirty="0">
+                <a:solidFill>
+                  <a:srgbClr val="32C3FF"/>
+                </a:solidFill>
+              </a:rPr>
+              <a:t>Fabulous G5</a:t>
             </a:r>
           </a:p>
         </p:txBody>
       </p:sp>
       <p:sp>
         <p:nvSpPr>
-          <p:cNvPr id="3" name="Subtitle 2">
+          <p:cNvPr id="16" name="Marcador de Posição do Número do Diapositivo 15">
             <a:extLst>
               <a:ext uri="{FF2B5EF4-FFF2-40B4-BE49-F238E27FC236}">
-                <a16:creationId xmlns:a16="http://schemas.microsoft.com/office/drawing/2014/main" id="{A0BCBB67-62C0-A220-9432-762B0C346EE6}"/>
+                <a16:creationId xmlns:a16="http://schemas.microsoft.com/office/drawing/2014/main" id="{D612389E-6037-B545-F14B-371BA38E1360}"/>
               </a:ext>
             </a:extLst>
           </p:cNvPr>
@@ -7382,7 +7654,7 @@
             <a:spLocks noGrp="1"/>
           </p:cNvSpPr>
           <p:nvPr>
-            <p:ph type="subTitle" idx="1"/>
+            <p:ph type="sldNum" sz="quarter" idx="12"/>
           </p:nvPr>
         </p:nvSpPr>
         <p:spPr/>
@@ -7390,19 +7662,15 @@
           <a:bodyPr/>
           <a:lstStyle/>
           <a:p>
-            <a:r>
-              <a:rPr lang="en-US"/>
-              <a:t>Group name and members</a:t>
-            </a:r>
+            <a:fld id="{C1FF6DA9-008F-8B48-92A6-B652298478BF}" type="slidenum">
+              <a:rPr lang="en-US" smtClean="0"/>
+              <a:t>1</a:t>
+            </a:fld>
+            <a:endParaRPr lang="en-US"/>
           </a:p>
         </p:txBody>
       </p:sp>
     </p:spTree>
-    <p:extLst>
-      <p:ext uri="{BB962C8B-B14F-4D97-AF65-F5344CB8AC3E}">
-        <p14:creationId xmlns:p14="http://schemas.microsoft.com/office/powerpoint/2010/main" val="2735999561"/>
-      </p:ext>
-    </p:extLst>
   </p:cSld>
   <p:clrMapOvr>
     <a:masterClrMapping/>
@@ -7482,25 +7750,25 @@
           <a:lstStyle/>
           <a:p>
             <a:r>
-              <a:rPr lang="en-US"/>
+              <a:rPr lang="en-US" dirty="0"/>
               <a:t>Final result (i.e. accuracy achieved) </a:t>
             </a:r>
           </a:p>
           <a:p>
             <a:r>
-              <a:rPr lang="en-US"/>
+              <a:rPr lang="en-US" dirty="0"/>
               <a:t>Model used</a:t>
             </a:r>
           </a:p>
           <a:p>
             <a:r>
-              <a:rPr lang="en-US"/>
+              <a:rPr lang="en-US" dirty="0"/>
               <a:t>Quick recap of alternatives considered</a:t>
             </a:r>
           </a:p>
           <a:p>
             <a:r>
-              <a:rPr lang="en-US"/>
+              <a:rPr lang="en-US" dirty="0"/>
               <a:t>Other important methodology or considerations</a:t>
             </a:r>
           </a:p>

</xml_diff>